<commit_message>
First try with ADEDAPP.pptx
</commit_message>
<xml_diff>
--- a/Presentacion Terminada.pptx
+++ b/Presentacion Terminada.pptx
@@ -112,7 +112,7 @@
   <p:extLst>
     <p:ext uri="{EFAFB233-063F-42B5-8137-9DF3F51BA10A}">
       <p15:sldGuideLst xmlns:p15="http://schemas.microsoft.com/office/powerpoint/2012/main">
-        <p15:guide id="1" orient="horz" pos="1139" userDrawn="1">
+        <p15:guide id="1" orient="horz" pos="1117" userDrawn="1">
           <p15:clr>
             <a:srgbClr val="A4A3A4"/>
           </p15:clr>
@@ -226,7 +226,7 @@
           <a:p>
             <a:fld id="{CD18E0D6-6212-E842-A73E-3B7FC6A8F192}" type="datetimeFigureOut">
               <a:rPr lang="es-ES_tradnl" smtClean="0"/>
-              <a:t>29/11/2020</a:t>
+              <a:t>28/11/2020</a:t>
             </a:fld>
             <a:endParaRPr lang="es-ES_tradnl"/>
           </a:p>
@@ -624,7 +624,7 @@
           <a:p>
             <a:fld id="{BFB120B0-2BAF-C849-945E-F9FEF71CE641}" type="datetimeFigureOut">
               <a:rPr lang="es-PA" smtClean="0"/>
-              <a:t>29/11/20</a:t>
+              <a:t>28/11/20</a:t>
             </a:fld>
             <a:endParaRPr lang="es-PA"/>
           </a:p>
@@ -770,7 +770,7 @@
           <a:p>
             <a:fld id="{BFB120B0-2BAF-C849-945E-F9FEF71CE641}" type="datetimeFigureOut">
               <a:rPr lang="es-PA" smtClean="0"/>
-              <a:t>29/11/20</a:t>
+              <a:t>28/11/20</a:t>
             </a:fld>
             <a:endParaRPr lang="es-PA"/>
           </a:p>
@@ -926,7 +926,7 @@
           <a:p>
             <a:fld id="{BFB120B0-2BAF-C849-945E-F9FEF71CE641}" type="datetimeFigureOut">
               <a:rPr lang="es-PA" smtClean="0"/>
-              <a:t>29/11/20</a:t>
+              <a:t>28/11/20</a:t>
             </a:fld>
             <a:endParaRPr lang="es-PA"/>
           </a:p>
@@ -1072,7 +1072,7 @@
           <a:p>
             <a:fld id="{BFB120B0-2BAF-C849-945E-F9FEF71CE641}" type="datetimeFigureOut">
               <a:rPr lang="es-PA" smtClean="0"/>
-              <a:t>29/11/20</a:t>
+              <a:t>28/11/20</a:t>
             </a:fld>
             <a:endParaRPr lang="es-PA"/>
           </a:p>
@@ -1321,7 +1321,7 @@
           <a:p>
             <a:fld id="{BFB120B0-2BAF-C849-945E-F9FEF71CE641}" type="datetimeFigureOut">
               <a:rPr lang="es-PA" smtClean="0"/>
-              <a:t>29/11/20</a:t>
+              <a:t>28/11/20</a:t>
             </a:fld>
             <a:endParaRPr lang="es-PA"/>
           </a:p>
@@ -1385,20 +1385,6 @@
 <file path=ppt/slideLayouts/slideLayout4.xml><?xml version="1.0" encoding="utf-8"?>
 <p:sldLayout xmlns:a="http://schemas.openxmlformats.org/drawingml/2006/main" xmlns:r="http://schemas.openxmlformats.org/officeDocument/2006/relationships" xmlns:p="http://schemas.openxmlformats.org/presentationml/2006/main" preserve="1" userDrawn="1">
   <p:cSld name="Dos objetos">
-    <p:bg>
-      <p:bgPr>
-        <a:blipFill dpi="0" rotWithShape="1">
-          <a:blip r:embed="rId2">
-            <a:lum/>
-          </a:blip>
-          <a:srcRect/>
-          <a:stretch>
-            <a:fillRect t="-1000" b="-1000"/>
-          </a:stretch>
-        </a:blipFill>
-        <a:effectLst/>
-      </p:bgPr>
-    </p:bg>
     <p:spTree>
       <p:nvGrpSpPr>
         <p:cNvPr id="1" name=""/>
@@ -1420,12 +1406,12 @@
             <a:spLocks noGrp="1"/>
           </p:cNvSpPr>
           <p:nvPr>
-            <p:ph type="title" hasCustomPrompt="1"/>
+            <p:ph type="title"/>
           </p:nvPr>
         </p:nvSpPr>
         <p:spPr>
           <a:xfrm>
-            <a:off x="304799" y="230367"/>
+            <a:off x="1311563" y="18256"/>
             <a:ext cx="5975927" cy="729890"/>
           </a:xfrm>
         </p:spPr>
@@ -1433,11 +1419,10 @@
           <a:bodyPr/>
           <a:lstStyle>
             <a:lvl1pPr>
-              <a:defRPr b="1">
+              <a:defRPr>
                 <a:solidFill>
-                  <a:schemeClr val="tx1"/>
+                  <a:schemeClr val="bg1"/>
                 </a:solidFill>
-                <a:latin typeface="Trebuchet MS" panose="020B0603020202020204" pitchFamily="34" charset="0"/>
               </a:defRPr>
             </a:lvl1pPr>
           </a:lstStyle>
@@ -1499,7 +1484,7 @@
           <a:p>
             <a:fld id="{BFB120B0-2BAF-C849-945E-F9FEF71CE641}" type="datetimeFigureOut">
               <a:rPr lang="es-PA" smtClean="0"/>
-              <a:t>29/11/20</a:t>
+              <a:t>28/11/20</a:t>
             </a:fld>
             <a:endParaRPr lang="es-PA"/>
           </a:p>
@@ -1866,7 +1851,7 @@
           <a:p>
             <a:fld id="{BFB120B0-2BAF-C849-945E-F9FEF71CE641}" type="datetimeFigureOut">
               <a:rPr lang="es-PA" smtClean="0"/>
-              <a:t>29/11/20</a:t>
+              <a:t>28/11/20</a:t>
             </a:fld>
             <a:endParaRPr lang="es-PA"/>
           </a:p>
@@ -1984,7 +1969,7 @@
           <a:p>
             <a:fld id="{BFB120B0-2BAF-C849-945E-F9FEF71CE641}" type="datetimeFigureOut">
               <a:rPr lang="es-PA" smtClean="0"/>
-              <a:t>29/11/20</a:t>
+              <a:t>28/11/20</a:t>
             </a:fld>
             <a:endParaRPr lang="es-PA"/>
           </a:p>
@@ -2079,7 +2064,7 @@
           <a:p>
             <a:fld id="{BFB120B0-2BAF-C849-945E-F9FEF71CE641}" type="datetimeFigureOut">
               <a:rPr lang="es-PA" smtClean="0"/>
-              <a:t>29/11/20</a:t>
+              <a:t>28/11/20</a:t>
             </a:fld>
             <a:endParaRPr lang="es-PA"/>
           </a:p>
@@ -2337,7 +2322,7 @@
           <a:p>
             <a:fld id="{BFB120B0-2BAF-C849-945E-F9FEF71CE641}" type="datetimeFigureOut">
               <a:rPr lang="es-PA" smtClean="0"/>
-              <a:t>29/11/20</a:t>
+              <a:t>28/11/20</a:t>
             </a:fld>
             <a:endParaRPr lang="es-PA"/>
           </a:p>
@@ -2599,7 +2584,7 @@
           <a:p>
             <a:fld id="{BFB120B0-2BAF-C849-945E-F9FEF71CE641}" type="datetimeFigureOut">
               <a:rPr lang="es-PA" smtClean="0"/>
-              <a:t>29/11/20</a:t>
+              <a:t>28/11/20</a:t>
             </a:fld>
             <a:endParaRPr lang="es-PA"/>
           </a:p>
@@ -2797,7 +2782,7 @@
           <a:p>
             <a:fld id="{BFB120B0-2BAF-C849-945E-F9FEF71CE641}" type="datetimeFigureOut">
               <a:rPr lang="es-PA" smtClean="0"/>
-              <a:t>29/11/20</a:t>
+              <a:t>28/11/20</a:t>
             </a:fld>
             <a:endParaRPr lang="es-PA"/>
           </a:p>
@@ -3641,7 +3626,7 @@
       </p:pic>
       <p:pic>
         <p:nvPicPr>
-          <p:cNvPr id="7" name="Picture 6" descr="TT 1.jpg"/>
+          <p:cNvPr id="7" name="Picture 6" descr="ADEDAPP 1.jpg"/>
           <p:cNvPicPr>
             <a:picLocks noChangeAspect="1"/>
           </p:cNvPicPr>
@@ -4127,7 +4112,7 @@
       </p:pic>
       <p:pic>
         <p:nvPicPr>
-          <p:cNvPr id="7" name="Picture 6" descr="TT 2.jpg"/>
+          <p:cNvPr id="7" name="Picture 6" descr="ADEDAPP 2.jpg"/>
           <p:cNvPicPr>
             <a:picLocks noChangeAspect="1"/>
           </p:cNvPicPr>
@@ -4613,7 +4598,7 @@
       </p:pic>
       <p:pic>
         <p:nvPicPr>
-          <p:cNvPr id="7" name="Picture 6" descr="TT 3.jpg"/>
+          <p:cNvPr id="7" name="Picture 6" descr="ADEDAPP 3.jpg"/>
           <p:cNvPicPr>
             <a:picLocks noChangeAspect="1"/>
           </p:cNvPicPr>

</xml_diff>